<commit_message>
finish inital draft of presentation
</commit_message>
<xml_diff>
--- a/Presentation/Desert Code Camp 2016 - Gulp.pptx
+++ b/Presentation/Desert Code Camp 2016 - Gulp.pptx
@@ -5,12 +5,14 @@
     <p:sldMasterId id="2147483678" r:id="rId1"/>
   </p:sldMasterIdLst>
   <p:notesMasterIdLst>
-    <p:notesMasterId r:id="rId5"/>
+    <p:notesMasterId r:id="rId7"/>
   </p:notesMasterIdLst>
   <p:sldIdLst>
     <p:sldId id="256" r:id="rId2"/>
     <p:sldId id="257" r:id="rId3"/>
     <p:sldId id="258" r:id="rId4"/>
+    <p:sldId id="259" r:id="rId5"/>
+    <p:sldId id="261" r:id="rId6"/>
   </p:sldIdLst>
   <p:sldSz cx="12192000" cy="6858000"/>
   <p:notesSz cx="6858000" cy="9144000"/>
@@ -109,6 +111,11 @@
       </a:defRPr>
     </a:lvl9pPr>
   </p:defaultTextStyle>
+  <p:extLst>
+    <p:ext uri="{EFAFB233-063F-42B5-8137-9DF3F51BA10A}">
+      <p15:sldGuideLst xmlns:p15="http://schemas.microsoft.com/office/powerpoint/2012/main"/>
+    </p:ext>
+  </p:extLst>
 </p:presentation>
 </file>
 
@@ -194,7 +201,7 @@
           <a:p>
             <a:fld id="{E1998378-1A2B-4017-8F53-116229F3B6FC}" type="datetimeFigureOut">
               <a:rPr lang="en-US" smtClean="0"/>
-              <a:t>9/1/2016</a:t>
+              <a:t>9/2/2016</a:t>
             </a:fld>
             <a:endParaRPr lang="en-US"/>
           </a:p>
@@ -513,12 +520,12 @@
           </a:p>
           <a:p>
             <a:r>
-              <a:rPr lang="en-US" smtClean="0"/>
+              <a:rPr lang="en-US" dirty="0" smtClean="0"/>
               <a:t>https://scotch.io/tutorials/automate-your-tasks-easily-with-gulp-js</a:t>
             </a:r>
           </a:p>
           <a:p>
-            <a:endParaRPr lang="en-US"/>
+            <a:endParaRPr lang="en-US" dirty="0"/>
           </a:p>
         </p:txBody>
       </p:sp>
@@ -633,6 +640,96 @@
     <p:extLst>
       <p:ext uri="{BB962C8B-B14F-4D97-AF65-F5344CB8AC3E}">
         <p14:creationId xmlns:p14="http://schemas.microsoft.com/office/powerpoint/2010/main" val="3527716988"/>
+      </p:ext>
+    </p:extLst>
+  </p:cSld>
+  <p:clrMapOvr>
+    <a:masterClrMapping/>
+  </p:clrMapOvr>
+</p:notes>
+</file>
+
+<file path=ppt/notesSlides/notesSlide3.xml><?xml version="1.0" encoding="utf-8"?>
+<p:notes xmlns:a="http://schemas.openxmlformats.org/drawingml/2006/main" xmlns:r="http://schemas.openxmlformats.org/officeDocument/2006/relationships" xmlns:p="http://schemas.openxmlformats.org/presentationml/2006/main">
+  <p:cSld>
+    <p:spTree>
+      <p:nvGrpSpPr>
+        <p:cNvPr id="1" name=""/>
+        <p:cNvGrpSpPr/>
+        <p:nvPr/>
+      </p:nvGrpSpPr>
+      <p:grpSpPr>
+        <a:xfrm>
+          <a:off x="0" y="0"/>
+          <a:ext cx="0" cy="0"/>
+          <a:chOff x="0" y="0"/>
+          <a:chExt cx="0" cy="0"/>
+        </a:xfrm>
+      </p:grpSpPr>
+      <p:sp>
+        <p:nvSpPr>
+          <p:cNvPr id="2" name="Slide Image Placeholder 1"/>
+          <p:cNvSpPr>
+            <a:spLocks noGrp="1" noRot="1" noChangeAspect="1"/>
+          </p:cNvSpPr>
+          <p:nvPr>
+            <p:ph type="sldImg"/>
+          </p:nvPr>
+        </p:nvSpPr>
+        <p:spPr/>
+      </p:sp>
+      <p:sp>
+        <p:nvSpPr>
+          <p:cNvPr id="3" name="Notes Placeholder 2"/>
+          <p:cNvSpPr>
+            <a:spLocks noGrp="1"/>
+          </p:cNvSpPr>
+          <p:nvPr>
+            <p:ph type="body" idx="1"/>
+          </p:nvPr>
+        </p:nvSpPr>
+        <p:spPr/>
+        <p:txBody>
+          <a:bodyPr/>
+          <a:lstStyle/>
+          <a:p>
+            <a:r>
+              <a:rPr lang="en-US" dirty="0" smtClean="0"/>
+              <a:t>https://en.wikipedia.org/wiki/Glob_(programming)</a:t>
+            </a:r>
+          </a:p>
+          <a:p>
+            <a:endParaRPr lang="en-US" dirty="0"/>
+          </a:p>
+        </p:txBody>
+      </p:sp>
+      <p:sp>
+        <p:nvSpPr>
+          <p:cNvPr id="4" name="Slide Number Placeholder 3"/>
+          <p:cNvSpPr>
+            <a:spLocks noGrp="1"/>
+          </p:cNvSpPr>
+          <p:nvPr>
+            <p:ph type="sldNum" sz="quarter" idx="10"/>
+          </p:nvPr>
+        </p:nvSpPr>
+        <p:spPr/>
+        <p:txBody>
+          <a:bodyPr/>
+          <a:lstStyle/>
+          <a:p>
+            <a:fld id="{F7C4A106-3387-4C5D-8EEF-DBB8A2FC1112}" type="slidenum">
+              <a:rPr lang="en-US" smtClean="0"/>
+              <a:t>4</a:t>
+            </a:fld>
+            <a:endParaRPr lang="en-US"/>
+          </a:p>
+        </p:txBody>
+      </p:sp>
+    </p:spTree>
+    <p:extLst>
+      <p:ext uri="{BB962C8B-B14F-4D97-AF65-F5344CB8AC3E}">
+        <p14:creationId xmlns:p14="http://schemas.microsoft.com/office/powerpoint/2010/main" val="2226536361"/>
       </p:ext>
     </p:extLst>
   </p:cSld>
@@ -692,7 +789,7 @@
           <a:noFill/>
           <a:extLst>
             <a:ext uri="{909E8E84-426E-40dd-AFC4-6F175D3DCCD1}">
-              <a14:hiddenFill xmlns:a14="http://schemas.microsoft.com/office/drawing/2010/main" xmlns="">
+              <a14:hiddenFill xmlns="" xmlns:a14="http://schemas.microsoft.com/office/drawing/2010/main">
                 <a:solidFill>
                   <a:srgbClr val="FFFFFF"/>
                 </a:solidFill>
@@ -752,7 +849,7 @@
             </a:ln>
             <a:extLst>
               <a:ext uri="{91240B29-F687-4f45-9708-019B960494DF}">
-                <a14:hiddenLine xmlns:a14="http://schemas.microsoft.com/office/drawing/2010/main" xmlns="" w="9525">
+                <a14:hiddenLine xmlns="" xmlns:a14="http://schemas.microsoft.com/office/drawing/2010/main" w="9525">
                   <a:solidFill>
                     <a:srgbClr val="000000"/>
                   </a:solidFill>
@@ -842,7 +939,7 @@
             </a:ln>
             <a:extLst>
               <a:ext uri="{91240B29-F687-4f45-9708-019B960494DF}">
-                <a14:hiddenLine xmlns:a14="http://schemas.microsoft.com/office/drawing/2010/main" xmlns="" w="9525">
+                <a14:hiddenLine xmlns="" xmlns:a14="http://schemas.microsoft.com/office/drawing/2010/main" w="9525">
                   <a:solidFill>
                     <a:srgbClr val="000000"/>
                   </a:solidFill>
@@ -932,7 +1029,7 @@
             </a:ln>
             <a:extLst>
               <a:ext uri="{91240B29-F687-4f45-9708-019B960494DF}">
-                <a14:hiddenLine xmlns:a14="http://schemas.microsoft.com/office/drawing/2010/main" xmlns="" w="9525">
+                <a14:hiddenLine xmlns="" xmlns:a14="http://schemas.microsoft.com/office/drawing/2010/main" w="9525">
                   <a:solidFill>
                     <a:srgbClr val="000000"/>
                   </a:solidFill>
@@ -966,7 +1063,7 @@
             </a:ln>
             <a:extLst>
               <a:ext uri="{91240B29-F687-4f45-9708-019B960494DF}">
-                <a14:hiddenLine xmlns:a14="http://schemas.microsoft.com/office/drawing/2010/main" xmlns="" w="9525">
+                <a14:hiddenLine xmlns="" xmlns:a14="http://schemas.microsoft.com/office/drawing/2010/main" w="9525">
                   <a:solidFill>
                     <a:srgbClr val="000000"/>
                   </a:solidFill>
@@ -1056,7 +1153,7 @@
             </a:ln>
             <a:extLst>
               <a:ext uri="{91240B29-F687-4f45-9708-019B960494DF}">
-                <a14:hiddenLine xmlns:a14="http://schemas.microsoft.com/office/drawing/2010/main" xmlns="" w="9525">
+                <a14:hiddenLine xmlns="" xmlns:a14="http://schemas.microsoft.com/office/drawing/2010/main" w="9525">
                   <a:solidFill>
                     <a:srgbClr val="000000"/>
                   </a:solidFill>
@@ -1118,7 +1215,7 @@
             </a:ln>
             <a:extLst>
               <a:ext uri="{91240B29-F687-4f45-9708-019B960494DF}">
-                <a14:hiddenLine xmlns:a14="http://schemas.microsoft.com/office/drawing/2010/main" xmlns="" w="9525">
+                <a14:hiddenLine xmlns="" xmlns:a14="http://schemas.microsoft.com/office/drawing/2010/main" w="9525">
                   <a:solidFill>
                     <a:srgbClr val="000000"/>
                   </a:solidFill>
@@ -1180,7 +1277,7 @@
             </a:ln>
             <a:extLst>
               <a:ext uri="{91240B29-F687-4f45-9708-019B960494DF}">
-                <a14:hiddenLine xmlns:a14="http://schemas.microsoft.com/office/drawing/2010/main" xmlns="" w="9525">
+                <a14:hiddenLine xmlns="" xmlns:a14="http://schemas.microsoft.com/office/drawing/2010/main" w="9525">
                   <a:solidFill>
                     <a:srgbClr val="000000"/>
                   </a:solidFill>
@@ -1270,7 +1367,7 @@
             </a:ln>
             <a:extLst>
               <a:ext uri="{91240B29-F687-4f45-9708-019B960494DF}">
-                <a14:hiddenLine xmlns:a14="http://schemas.microsoft.com/office/drawing/2010/main" xmlns="" w="9525">
+                <a14:hiddenLine xmlns="" xmlns:a14="http://schemas.microsoft.com/office/drawing/2010/main" w="9525">
                   <a:solidFill>
                     <a:srgbClr val="000000"/>
                   </a:solidFill>
@@ -1332,7 +1429,7 @@
             </a:ln>
             <a:extLst>
               <a:ext uri="{91240B29-F687-4f45-9708-019B960494DF}">
-                <a14:hiddenLine xmlns:a14="http://schemas.microsoft.com/office/drawing/2010/main" xmlns="" w="9525">
+                <a14:hiddenLine xmlns="" xmlns:a14="http://schemas.microsoft.com/office/drawing/2010/main" w="9525">
                   <a:solidFill>
                     <a:srgbClr val="000000"/>
                   </a:solidFill>
@@ -1394,7 +1491,7 @@
             </a:ln>
             <a:extLst>
               <a:ext uri="{91240B29-F687-4f45-9708-019B960494DF}">
-                <a14:hiddenLine xmlns:a14="http://schemas.microsoft.com/office/drawing/2010/main" xmlns="" w="9525">
+                <a14:hiddenLine xmlns="" xmlns:a14="http://schemas.microsoft.com/office/drawing/2010/main" w="9525">
                   <a:solidFill>
                     <a:srgbClr val="000000"/>
                   </a:solidFill>
@@ -1484,7 +1581,7 @@
             </a:ln>
             <a:extLst>
               <a:ext uri="{91240B29-F687-4f45-9708-019B960494DF}">
-                <a14:hiddenLine xmlns:a14="http://schemas.microsoft.com/office/drawing/2010/main" xmlns="" w="9525">
+                <a14:hiddenLine xmlns="" xmlns:a14="http://schemas.microsoft.com/office/drawing/2010/main" w="9525">
                   <a:solidFill>
                     <a:srgbClr val="000000"/>
                   </a:solidFill>
@@ -1574,7 +1671,7 @@
             </a:ln>
             <a:extLst>
               <a:ext uri="{91240B29-F687-4f45-9708-019B960494DF}">
-                <a14:hiddenLine xmlns:a14="http://schemas.microsoft.com/office/drawing/2010/main" xmlns="" w="9525">
+                <a14:hiddenLine xmlns="" xmlns:a14="http://schemas.microsoft.com/office/drawing/2010/main" w="9525">
                   <a:solidFill>
                     <a:srgbClr val="000000"/>
                   </a:solidFill>
@@ -1636,7 +1733,7 @@
             </a:ln>
             <a:extLst>
               <a:ext uri="{91240B29-F687-4f45-9708-019B960494DF}">
-                <a14:hiddenLine xmlns:a14="http://schemas.microsoft.com/office/drawing/2010/main" xmlns="" w="9525">
+                <a14:hiddenLine xmlns="" xmlns:a14="http://schemas.microsoft.com/office/drawing/2010/main" w="9525">
                   <a:solidFill>
                     <a:srgbClr val="000000"/>
                   </a:solidFill>
@@ -1746,7 +1843,7 @@
             </a:ln>
             <a:extLst>
               <a:ext uri="{91240B29-F687-4f45-9708-019B960494DF}">
-                <a14:hiddenLine xmlns:a14="http://schemas.microsoft.com/office/drawing/2010/main" xmlns="" w="9525">
+                <a14:hiddenLine xmlns="" xmlns:a14="http://schemas.microsoft.com/office/drawing/2010/main" w="9525">
                   <a:solidFill>
                     <a:srgbClr val="000000"/>
                   </a:solidFill>
@@ -1808,7 +1905,7 @@
             </a:ln>
             <a:extLst>
               <a:ext uri="{91240B29-F687-4f45-9708-019B960494DF}">
-                <a14:hiddenLine xmlns:a14="http://schemas.microsoft.com/office/drawing/2010/main" xmlns="" w="9525">
+                <a14:hiddenLine xmlns="" xmlns:a14="http://schemas.microsoft.com/office/drawing/2010/main" w="9525">
                   <a:solidFill>
                     <a:srgbClr val="000000"/>
                   </a:solidFill>
@@ -1898,7 +1995,7 @@
             </a:ln>
             <a:extLst>
               <a:ext uri="{91240B29-F687-4f45-9708-019B960494DF}">
-                <a14:hiddenLine xmlns:a14="http://schemas.microsoft.com/office/drawing/2010/main" xmlns="" w="9525">
+                <a14:hiddenLine xmlns="" xmlns:a14="http://schemas.microsoft.com/office/drawing/2010/main" w="9525">
                   <a:solidFill>
                     <a:srgbClr val="000000"/>
                   </a:solidFill>
@@ -1988,7 +2085,7 @@
             </a:ln>
             <a:extLst>
               <a:ext uri="{91240B29-F687-4f45-9708-019B960494DF}">
-                <a14:hiddenLine xmlns:a14="http://schemas.microsoft.com/office/drawing/2010/main" xmlns="" w="9525">
+                <a14:hiddenLine xmlns="" xmlns:a14="http://schemas.microsoft.com/office/drawing/2010/main" w="9525">
                   <a:solidFill>
                     <a:srgbClr val="000000"/>
                   </a:solidFill>
@@ -2050,7 +2147,7 @@
             </a:ln>
             <a:extLst>
               <a:ext uri="{91240B29-F687-4f45-9708-019B960494DF}">
-                <a14:hiddenLine xmlns:a14="http://schemas.microsoft.com/office/drawing/2010/main" xmlns="" w="9525">
+                <a14:hiddenLine xmlns="" xmlns:a14="http://schemas.microsoft.com/office/drawing/2010/main" w="9525">
                   <a:solidFill>
                     <a:srgbClr val="000000"/>
                   </a:solidFill>
@@ -2140,7 +2237,7 @@
             </a:ln>
             <a:extLst>
               <a:ext uri="{91240B29-F687-4f45-9708-019B960494DF}">
-                <a14:hiddenLine xmlns:a14="http://schemas.microsoft.com/office/drawing/2010/main" xmlns="" w="9525">
+                <a14:hiddenLine xmlns="" xmlns:a14="http://schemas.microsoft.com/office/drawing/2010/main" w="9525">
                   <a:solidFill>
                     <a:srgbClr val="000000"/>
                   </a:solidFill>
@@ -2230,7 +2327,7 @@
             </a:ln>
             <a:extLst>
               <a:ext uri="{91240B29-F687-4f45-9708-019B960494DF}">
-                <a14:hiddenLine xmlns:a14="http://schemas.microsoft.com/office/drawing/2010/main" xmlns="" w="9525">
+                <a14:hiddenLine xmlns="" xmlns:a14="http://schemas.microsoft.com/office/drawing/2010/main" w="9525">
                   <a:solidFill>
                     <a:srgbClr val="000000"/>
                   </a:solidFill>
@@ -2286,7 +2383,7 @@
             </a:ln>
             <a:extLst>
               <a:ext uri="{91240B29-F687-4f45-9708-019B960494DF}">
-                <a14:hiddenLine xmlns:a14="http://schemas.microsoft.com/office/drawing/2010/main" xmlns="" w="9525">
+                <a14:hiddenLine xmlns="" xmlns:a14="http://schemas.microsoft.com/office/drawing/2010/main" w="9525">
                   <a:solidFill>
                     <a:srgbClr val="000000"/>
                   </a:solidFill>
@@ -2376,7 +2473,7 @@
             </a:ln>
             <a:extLst>
               <a:ext uri="{91240B29-F687-4f45-9708-019B960494DF}">
-                <a14:hiddenLine xmlns:a14="http://schemas.microsoft.com/office/drawing/2010/main" xmlns="" w="9525">
+                <a14:hiddenLine xmlns="" xmlns:a14="http://schemas.microsoft.com/office/drawing/2010/main" w="9525">
                   <a:solidFill>
                     <a:srgbClr val="000000"/>
                   </a:solidFill>
@@ -2432,7 +2529,7 @@
             </a:ln>
             <a:extLst>
               <a:ext uri="{91240B29-F687-4f45-9708-019B960494DF}">
-                <a14:hiddenLine xmlns:a14="http://schemas.microsoft.com/office/drawing/2010/main" xmlns="" w="9525">
+                <a14:hiddenLine xmlns="" xmlns:a14="http://schemas.microsoft.com/office/drawing/2010/main" w="9525">
                   <a:solidFill>
                     <a:srgbClr val="000000"/>
                   </a:solidFill>
@@ -2522,7 +2619,7 @@
             </a:ln>
             <a:extLst>
               <a:ext uri="{91240B29-F687-4f45-9708-019B960494DF}">
-                <a14:hiddenLine xmlns:a14="http://schemas.microsoft.com/office/drawing/2010/main" xmlns="" w="9525">
+                <a14:hiddenLine xmlns="" xmlns:a14="http://schemas.microsoft.com/office/drawing/2010/main" w="9525">
                   <a:solidFill>
                     <a:srgbClr val="000000"/>
                   </a:solidFill>
@@ -2590,7 +2687,7 @@
             </a:ln>
             <a:extLst>
               <a:ext uri="{91240B29-F687-4f45-9708-019B960494DF}">
-                <a14:hiddenLine xmlns:a14="http://schemas.microsoft.com/office/drawing/2010/main" xmlns="" w="9525">
+                <a14:hiddenLine xmlns="" xmlns:a14="http://schemas.microsoft.com/office/drawing/2010/main" w="9525">
                   <a:solidFill>
                     <a:srgbClr val="000000"/>
                   </a:solidFill>
@@ -2680,7 +2777,7 @@
             </a:ln>
             <a:extLst>
               <a:ext uri="{91240B29-F687-4f45-9708-019B960494DF}">
-                <a14:hiddenLine xmlns:a14="http://schemas.microsoft.com/office/drawing/2010/main" xmlns="" w="9525">
+                <a14:hiddenLine xmlns="" xmlns:a14="http://schemas.microsoft.com/office/drawing/2010/main" w="9525">
                   <a:solidFill>
                     <a:srgbClr val="000000"/>
                   </a:solidFill>
@@ -2748,7 +2845,7 @@
             </a:ln>
             <a:extLst>
               <a:ext uri="{91240B29-F687-4f45-9708-019B960494DF}">
-                <a14:hiddenLine xmlns:a14="http://schemas.microsoft.com/office/drawing/2010/main" xmlns="" w="9525">
+                <a14:hiddenLine xmlns="" xmlns:a14="http://schemas.microsoft.com/office/drawing/2010/main" w="9525">
                   <a:solidFill>
                     <a:srgbClr val="000000"/>
                   </a:solidFill>
@@ -2838,7 +2935,7 @@
             </a:ln>
             <a:extLst>
               <a:ext uri="{91240B29-F687-4f45-9708-019B960494DF}">
-                <a14:hiddenLine xmlns:a14="http://schemas.microsoft.com/office/drawing/2010/main" xmlns="" w="9525">
+                <a14:hiddenLine xmlns="" xmlns:a14="http://schemas.microsoft.com/office/drawing/2010/main" w="9525">
                   <a:solidFill>
                     <a:srgbClr val="000000"/>
                   </a:solidFill>
@@ -2872,7 +2969,7 @@
             </a:ln>
             <a:extLst>
               <a:ext uri="{91240B29-F687-4f45-9708-019B960494DF}">
-                <a14:hiddenLine xmlns:a14="http://schemas.microsoft.com/office/drawing/2010/main" xmlns="" w="9525">
+                <a14:hiddenLine xmlns="" xmlns:a14="http://schemas.microsoft.com/office/drawing/2010/main" w="9525">
                   <a:solidFill>
                     <a:srgbClr val="000000"/>
                   </a:solidFill>
@@ -2962,7 +3059,7 @@
             </a:ln>
             <a:extLst>
               <a:ext uri="{91240B29-F687-4f45-9708-019B960494DF}">
-                <a14:hiddenLine xmlns:a14="http://schemas.microsoft.com/office/drawing/2010/main" xmlns="" w="9525">
+                <a14:hiddenLine xmlns="" xmlns:a14="http://schemas.microsoft.com/office/drawing/2010/main" w="9525">
                   <a:solidFill>
                     <a:srgbClr val="000000"/>
                   </a:solidFill>
@@ -3024,7 +3121,7 @@
             </a:ln>
             <a:extLst>
               <a:ext uri="{91240B29-F687-4f45-9708-019B960494DF}">
-                <a14:hiddenLine xmlns:a14="http://schemas.microsoft.com/office/drawing/2010/main" xmlns="" w="9525">
+                <a14:hiddenLine xmlns="" xmlns:a14="http://schemas.microsoft.com/office/drawing/2010/main" w="9525">
                   <a:solidFill>
                     <a:srgbClr val="000000"/>
                   </a:solidFill>
@@ -3086,7 +3183,7 @@
             </a:ln>
             <a:extLst>
               <a:ext uri="{91240B29-F687-4f45-9708-019B960494DF}">
-                <a14:hiddenLine xmlns:a14="http://schemas.microsoft.com/office/drawing/2010/main" xmlns="" w="9525">
+                <a14:hiddenLine xmlns="" xmlns:a14="http://schemas.microsoft.com/office/drawing/2010/main" w="9525">
                   <a:solidFill>
                     <a:srgbClr val="000000"/>
                   </a:solidFill>
@@ -3176,7 +3273,7 @@
             </a:ln>
             <a:extLst>
               <a:ext uri="{91240B29-F687-4f45-9708-019B960494DF}">
-                <a14:hiddenLine xmlns:a14="http://schemas.microsoft.com/office/drawing/2010/main" xmlns="" w="9525">
+                <a14:hiddenLine xmlns="" xmlns:a14="http://schemas.microsoft.com/office/drawing/2010/main" w="9525">
                   <a:solidFill>
                     <a:srgbClr val="000000"/>
                   </a:solidFill>
@@ -3244,7 +3341,7 @@
             </a:ln>
             <a:extLst>
               <a:ext uri="{91240B29-F687-4f45-9708-019B960494DF}">
-                <a14:hiddenLine xmlns:a14="http://schemas.microsoft.com/office/drawing/2010/main" xmlns="" w="9525">
+                <a14:hiddenLine xmlns="" xmlns:a14="http://schemas.microsoft.com/office/drawing/2010/main" w="9525">
                   <a:solidFill>
                     <a:srgbClr val="000000"/>
                   </a:solidFill>
@@ -3306,7 +3403,7 @@
             </a:ln>
             <a:extLst>
               <a:ext uri="{91240B29-F687-4f45-9708-019B960494DF}">
-                <a14:hiddenLine xmlns:a14="http://schemas.microsoft.com/office/drawing/2010/main" xmlns="" w="9525">
+                <a14:hiddenLine xmlns="" xmlns:a14="http://schemas.microsoft.com/office/drawing/2010/main" w="9525">
                   <a:solidFill>
                     <a:srgbClr val="000000"/>
                   </a:solidFill>
@@ -3396,7 +3493,7 @@
             </a:ln>
             <a:extLst>
               <a:ext uri="{91240B29-F687-4f45-9708-019B960494DF}">
-                <a14:hiddenLine xmlns:a14="http://schemas.microsoft.com/office/drawing/2010/main" xmlns="" w="9525">
+                <a14:hiddenLine xmlns="" xmlns:a14="http://schemas.microsoft.com/office/drawing/2010/main" w="9525">
                   <a:solidFill>
                     <a:srgbClr val="000000"/>
                   </a:solidFill>
@@ -3458,7 +3555,7 @@
             </a:ln>
             <a:extLst>
               <a:ext uri="{91240B29-F687-4f45-9708-019B960494DF}">
-                <a14:hiddenLine xmlns:a14="http://schemas.microsoft.com/office/drawing/2010/main" xmlns="" w="9525">
+                <a14:hiddenLine xmlns="" xmlns:a14="http://schemas.microsoft.com/office/drawing/2010/main" w="9525">
                   <a:solidFill>
                     <a:srgbClr val="000000"/>
                   </a:solidFill>
@@ -3548,7 +3645,7 @@
             </a:ln>
             <a:extLst>
               <a:ext uri="{91240B29-F687-4f45-9708-019B960494DF}">
-                <a14:hiddenLine xmlns:a14="http://schemas.microsoft.com/office/drawing/2010/main" xmlns="" w="9525">
+                <a14:hiddenLine xmlns="" xmlns:a14="http://schemas.microsoft.com/office/drawing/2010/main" w="9525">
                   <a:solidFill>
                     <a:srgbClr val="000000"/>
                   </a:solidFill>
@@ -3610,7 +3707,7 @@
             </a:ln>
             <a:extLst>
               <a:ext uri="{91240B29-F687-4f45-9708-019B960494DF}">
-                <a14:hiddenLine xmlns:a14="http://schemas.microsoft.com/office/drawing/2010/main" xmlns="" w="9525">
+                <a14:hiddenLine xmlns="" xmlns:a14="http://schemas.microsoft.com/office/drawing/2010/main" w="9525">
                   <a:solidFill>
                     <a:srgbClr val="000000"/>
                   </a:solidFill>
@@ -3700,7 +3797,7 @@
             </a:ln>
             <a:extLst>
               <a:ext uri="{91240B29-F687-4f45-9708-019B960494DF}">
-                <a14:hiddenLine xmlns:a14="http://schemas.microsoft.com/office/drawing/2010/main" xmlns="" w="9525">
+                <a14:hiddenLine xmlns="" xmlns:a14="http://schemas.microsoft.com/office/drawing/2010/main" w="9525">
                   <a:solidFill>
                     <a:srgbClr val="000000"/>
                   </a:solidFill>
@@ -3734,7 +3831,7 @@
             </a:ln>
             <a:extLst>
               <a:ext uri="{91240B29-F687-4f45-9708-019B960494DF}">
-                <a14:hiddenLine xmlns:a14="http://schemas.microsoft.com/office/drawing/2010/main" xmlns="" w="9525">
+                <a14:hiddenLine xmlns="" xmlns:a14="http://schemas.microsoft.com/office/drawing/2010/main" w="9525">
                   <a:solidFill>
                     <a:srgbClr val="000000"/>
                   </a:solidFill>
@@ -3799,7 +3896,7 @@
             </a:ln>
             <a:extLst>
               <a:ext uri="{91240B29-F687-4f45-9708-019B960494DF}">
-                <a14:hiddenLine xmlns:a14="http://schemas.microsoft.com/office/drawing/2010/main" xmlns="" w="9525">
+                <a14:hiddenLine xmlns="" xmlns:a14="http://schemas.microsoft.com/office/drawing/2010/main" w="9525">
                   <a:solidFill>
                     <a:srgbClr val="000000"/>
                   </a:solidFill>
@@ -3889,7 +3986,7 @@
             </a:ln>
             <a:extLst>
               <a:ext uri="{91240B29-F687-4f45-9708-019B960494DF}">
-                <a14:hiddenLine xmlns:a14="http://schemas.microsoft.com/office/drawing/2010/main" xmlns="" w="9525">
+                <a14:hiddenLine xmlns="" xmlns:a14="http://schemas.microsoft.com/office/drawing/2010/main" w="9525">
                   <a:solidFill>
                     <a:srgbClr val="000000"/>
                   </a:solidFill>
@@ -3951,7 +4048,7 @@
             </a:ln>
             <a:extLst>
               <a:ext uri="{91240B29-F687-4f45-9708-019B960494DF}">
-                <a14:hiddenLine xmlns:a14="http://schemas.microsoft.com/office/drawing/2010/main" xmlns="" w="9525">
+                <a14:hiddenLine xmlns="" xmlns:a14="http://schemas.microsoft.com/office/drawing/2010/main" w="9525">
                   <a:solidFill>
                     <a:srgbClr val="000000"/>
                   </a:solidFill>
@@ -4041,7 +4138,7 @@
             </a:ln>
             <a:extLst>
               <a:ext uri="{91240B29-F687-4f45-9708-019B960494DF}">
-                <a14:hiddenLine xmlns:a14="http://schemas.microsoft.com/office/drawing/2010/main" xmlns="" w="9525">
+                <a14:hiddenLine xmlns="" xmlns:a14="http://schemas.microsoft.com/office/drawing/2010/main" w="9525">
                   <a:solidFill>
                     <a:srgbClr val="000000"/>
                   </a:solidFill>
@@ -4131,7 +4228,7 @@
             </a:ln>
             <a:extLst>
               <a:ext uri="{91240B29-F687-4f45-9708-019B960494DF}">
-                <a14:hiddenLine xmlns:a14="http://schemas.microsoft.com/office/drawing/2010/main" xmlns="" w="9525">
+                <a14:hiddenLine xmlns="" xmlns:a14="http://schemas.microsoft.com/office/drawing/2010/main" w="9525">
                   <a:solidFill>
                     <a:srgbClr val="000000"/>
                   </a:solidFill>
@@ -4196,7 +4293,7 @@
             </a:ln>
             <a:extLst>
               <a:ext uri="{91240B29-F687-4f45-9708-019B960494DF}">
-                <a14:hiddenLine xmlns:a14="http://schemas.microsoft.com/office/drawing/2010/main" xmlns="" w="9525">
+                <a14:hiddenLine xmlns="" xmlns:a14="http://schemas.microsoft.com/office/drawing/2010/main" w="9525">
                   <a:solidFill>
                     <a:srgbClr val="000000"/>
                   </a:solidFill>
@@ -4258,7 +4355,7 @@
             </a:ln>
             <a:extLst>
               <a:ext uri="{91240B29-F687-4f45-9708-019B960494DF}">
-                <a14:hiddenLine xmlns:a14="http://schemas.microsoft.com/office/drawing/2010/main" xmlns="" w="9525">
+                <a14:hiddenLine xmlns="" xmlns:a14="http://schemas.microsoft.com/office/drawing/2010/main" w="9525">
                   <a:solidFill>
                     <a:srgbClr val="000000"/>
                   </a:solidFill>
@@ -4348,7 +4445,7 @@
             </a:ln>
             <a:extLst>
               <a:ext uri="{91240B29-F687-4f45-9708-019B960494DF}">
-                <a14:hiddenLine xmlns:a14="http://schemas.microsoft.com/office/drawing/2010/main" xmlns="" w="9525">
+                <a14:hiddenLine xmlns="" xmlns:a14="http://schemas.microsoft.com/office/drawing/2010/main" w="9525">
                   <a:solidFill>
                     <a:srgbClr val="000000"/>
                   </a:solidFill>
@@ -4438,7 +4535,7 @@
             </a:ln>
             <a:extLst>
               <a:ext uri="{91240B29-F687-4f45-9708-019B960494DF}">
-                <a14:hiddenLine xmlns:a14="http://schemas.microsoft.com/office/drawing/2010/main" xmlns="" w="9525">
+                <a14:hiddenLine xmlns="" xmlns:a14="http://schemas.microsoft.com/office/drawing/2010/main" w="9525">
                   <a:solidFill>
                     <a:srgbClr val="000000"/>
                   </a:solidFill>
@@ -4500,7 +4597,7 @@
             </a:ln>
             <a:extLst>
               <a:ext uri="{91240B29-F687-4f45-9708-019B960494DF}">
-                <a14:hiddenLine xmlns:a14="http://schemas.microsoft.com/office/drawing/2010/main" xmlns="" w="9525">
+                <a14:hiddenLine xmlns="" xmlns:a14="http://schemas.microsoft.com/office/drawing/2010/main" w="9525">
                   <a:solidFill>
                     <a:srgbClr val="000000"/>
                   </a:solidFill>
@@ -4620,7 +4717,7 @@
             </a:ln>
             <a:extLst>
               <a:ext uri="{91240B29-F687-4f45-9708-019B960494DF}">
-                <a14:hiddenLine xmlns:a14="http://schemas.microsoft.com/office/drawing/2010/main" xmlns="" w="9525">
+                <a14:hiddenLine xmlns="" xmlns:a14="http://schemas.microsoft.com/office/drawing/2010/main" w="9525">
                   <a:solidFill>
                     <a:srgbClr val="000000"/>
                   </a:solidFill>
@@ -4688,7 +4785,7 @@
             </a:ln>
             <a:extLst>
               <a:ext uri="{91240B29-F687-4f45-9708-019B960494DF}">
-                <a14:hiddenLine xmlns:a14="http://schemas.microsoft.com/office/drawing/2010/main" xmlns="" w="9525">
+                <a14:hiddenLine xmlns="" xmlns:a14="http://schemas.microsoft.com/office/drawing/2010/main" w="9525">
                   <a:solidFill>
                     <a:srgbClr val="000000"/>
                   </a:solidFill>
@@ -4778,7 +4875,7 @@
             </a:ln>
             <a:extLst>
               <a:ext uri="{91240B29-F687-4f45-9708-019B960494DF}">
-                <a14:hiddenLine xmlns:a14="http://schemas.microsoft.com/office/drawing/2010/main" xmlns="" w="9525">
+                <a14:hiddenLine xmlns="" xmlns:a14="http://schemas.microsoft.com/office/drawing/2010/main" w="9525">
                   <a:solidFill>
                     <a:srgbClr val="000000"/>
                   </a:solidFill>
@@ -4918,7 +5015,7 @@
           <a:p>
             <a:fld id="{9846A263-1905-4CB0-9C81-B4B3E5CE7713}" type="datetimeFigureOut">
               <a:rPr lang="en-US" smtClean="0"/>
-              <a:t>9/1/2016</a:t>
+              <a:t>9/2/2016</a:t>
             </a:fld>
             <a:endParaRPr lang="en-US"/>
           </a:p>
@@ -5185,7 +5282,7 @@
           <a:p>
             <a:fld id="{9846A263-1905-4CB0-9C81-B4B3E5CE7713}" type="datetimeFigureOut">
               <a:rPr lang="en-US" smtClean="0"/>
-              <a:t>9/1/2016</a:t>
+              <a:t>9/2/2016</a:t>
             </a:fld>
             <a:endParaRPr lang="en-US"/>
           </a:p>
@@ -5381,7 +5478,7 @@
           <a:p>
             <a:fld id="{9846A263-1905-4CB0-9C81-B4B3E5CE7713}" type="datetimeFigureOut">
               <a:rPr lang="en-US" smtClean="0"/>
-              <a:t>9/1/2016</a:t>
+              <a:t>9/2/2016</a:t>
             </a:fld>
             <a:endParaRPr lang="en-US"/>
           </a:p>
@@ -5644,7 +5741,7 @@
           <a:p>
             <a:fld id="{9846A263-1905-4CB0-9C81-B4B3E5CE7713}" type="datetimeFigureOut">
               <a:rPr lang="en-US" smtClean="0"/>
-              <a:t>9/1/2016</a:t>
+              <a:t>9/2/2016</a:t>
             </a:fld>
             <a:endParaRPr lang="en-US"/>
           </a:p>
@@ -6078,7 +6175,7 @@
           <a:p>
             <a:fld id="{9846A263-1905-4CB0-9C81-B4B3E5CE7713}" type="datetimeFigureOut">
               <a:rPr lang="en-US" smtClean="0"/>
-              <a:t>9/1/2016</a:t>
+              <a:t>9/2/2016</a:t>
             </a:fld>
             <a:endParaRPr lang="en-US"/>
           </a:p>
@@ -6624,7 +6721,7 @@
           <a:p>
             <a:fld id="{9846A263-1905-4CB0-9C81-B4B3E5CE7713}" type="datetimeFigureOut">
               <a:rPr lang="en-US" smtClean="0"/>
-              <a:t>9/1/2016</a:t>
+              <a:t>9/2/2016</a:t>
             </a:fld>
             <a:endParaRPr lang="en-US"/>
           </a:p>
@@ -7344,7 +7441,7 @@
           <a:p>
             <a:fld id="{9846A263-1905-4CB0-9C81-B4B3E5CE7713}" type="datetimeFigureOut">
               <a:rPr lang="en-US" smtClean="0"/>
-              <a:t>9/1/2016</a:t>
+              <a:t>9/2/2016</a:t>
             </a:fld>
             <a:endParaRPr lang="en-US"/>
           </a:p>
@@ -7514,7 +7611,7 @@
           <a:p>
             <a:fld id="{9846A263-1905-4CB0-9C81-B4B3E5CE7713}" type="datetimeFigureOut">
               <a:rPr lang="en-US" smtClean="0"/>
-              <a:t>9/1/2016</a:t>
+              <a:t>9/2/2016</a:t>
             </a:fld>
             <a:endParaRPr lang="en-US"/>
           </a:p>
@@ -7694,7 +7791,7 @@
           <a:p>
             <a:fld id="{9846A263-1905-4CB0-9C81-B4B3E5CE7713}" type="datetimeFigureOut">
               <a:rPr lang="en-US" smtClean="0"/>
-              <a:t>9/1/2016</a:t>
+              <a:t>9/2/2016</a:t>
             </a:fld>
             <a:endParaRPr lang="en-US"/>
           </a:p>
@@ -7864,7 +7961,7 @@
           <a:p>
             <a:fld id="{9846A263-1905-4CB0-9C81-B4B3E5CE7713}" type="datetimeFigureOut">
               <a:rPr lang="en-US" smtClean="0"/>
-              <a:t>9/1/2016</a:t>
+              <a:t>9/2/2016</a:t>
             </a:fld>
             <a:endParaRPr lang="en-US"/>
           </a:p>
@@ -8114,7 +8211,7 @@
           <a:p>
             <a:fld id="{9846A263-1905-4CB0-9C81-B4B3E5CE7713}" type="datetimeFigureOut">
               <a:rPr lang="en-US" smtClean="0"/>
-              <a:t>9/1/2016</a:t>
+              <a:t>9/2/2016</a:t>
             </a:fld>
             <a:endParaRPr lang="en-US"/>
           </a:p>
@@ -8346,7 +8443,7 @@
           <a:p>
             <a:fld id="{9846A263-1905-4CB0-9C81-B4B3E5CE7713}" type="datetimeFigureOut">
               <a:rPr lang="en-US" smtClean="0"/>
-              <a:t>9/1/2016</a:t>
+              <a:t>9/2/2016</a:t>
             </a:fld>
             <a:endParaRPr lang="en-US"/>
           </a:p>
@@ -8727,7 +8824,7 @@
           <a:p>
             <a:fld id="{9846A263-1905-4CB0-9C81-B4B3E5CE7713}" type="datetimeFigureOut">
               <a:rPr lang="en-US" smtClean="0"/>
-              <a:t>9/1/2016</a:t>
+              <a:t>9/2/2016</a:t>
             </a:fld>
             <a:endParaRPr lang="en-US"/>
           </a:p>
@@ -8845,7 +8942,7 @@
           <a:p>
             <a:fld id="{9846A263-1905-4CB0-9C81-B4B3E5CE7713}" type="datetimeFigureOut">
               <a:rPr lang="en-US" smtClean="0"/>
-              <a:t>9/1/2016</a:t>
+              <a:t>9/2/2016</a:t>
             </a:fld>
             <a:endParaRPr lang="en-US"/>
           </a:p>
@@ -8940,7 +9037,7 @@
           <a:p>
             <a:fld id="{9846A263-1905-4CB0-9C81-B4B3E5CE7713}" type="datetimeFigureOut">
               <a:rPr lang="en-US" smtClean="0"/>
-              <a:t>9/1/2016</a:t>
+              <a:t>9/2/2016</a:t>
             </a:fld>
             <a:endParaRPr lang="en-US"/>
           </a:p>
@@ -9189,7 +9286,7 @@
           <a:p>
             <a:fld id="{9846A263-1905-4CB0-9C81-B4B3E5CE7713}" type="datetimeFigureOut">
               <a:rPr lang="en-US" smtClean="0"/>
-              <a:t>9/1/2016</a:t>
+              <a:t>9/2/2016</a:t>
             </a:fld>
             <a:endParaRPr lang="en-US"/>
           </a:p>
@@ -9469,7 +9566,7 @@
           <a:p>
             <a:fld id="{9846A263-1905-4CB0-9C81-B4B3E5CE7713}" type="datetimeFigureOut">
               <a:rPr lang="en-US" smtClean="0"/>
-              <a:t>9/1/2016</a:t>
+              <a:t>9/2/2016</a:t>
             </a:fld>
             <a:endParaRPr lang="en-US"/>
           </a:p>
@@ -9585,7 +9682,7 @@
           <a:noFill/>
           <a:extLst>
             <a:ext uri="{909E8E84-426E-40dd-AFC4-6F175D3DCCD1}">
-              <a14:hiddenFill xmlns:a14="http://schemas.microsoft.com/office/drawing/2010/main" xmlns="">
+              <a14:hiddenFill xmlns="" xmlns:a14="http://schemas.microsoft.com/office/drawing/2010/main">
                 <a:solidFill>
                   <a:srgbClr val="FFFFFF"/>
                 </a:solidFill>
@@ -9659,7 +9756,7 @@
               </a:ln>
               <a:extLst>
                 <a:ext uri="{91240B29-F687-4f45-9708-019B960494DF}">
-                  <a14:hiddenLine xmlns:a14="http://schemas.microsoft.com/office/drawing/2010/main" xmlns="" w="9525">
+                  <a14:hiddenLine xmlns="" xmlns:a14="http://schemas.microsoft.com/office/drawing/2010/main" w="9525">
                     <a:solidFill>
                       <a:srgbClr val="000000"/>
                     </a:solidFill>
@@ -9749,7 +9846,7 @@
               </a:ln>
               <a:extLst>
                 <a:ext uri="{91240B29-F687-4f45-9708-019B960494DF}">
-                  <a14:hiddenLine xmlns:a14="http://schemas.microsoft.com/office/drawing/2010/main" xmlns="" w="9525">
+                  <a14:hiddenLine xmlns="" xmlns:a14="http://schemas.microsoft.com/office/drawing/2010/main" w="9525">
                     <a:solidFill>
                       <a:srgbClr val="000000"/>
                     </a:solidFill>
@@ -9839,7 +9936,7 @@
               </a:ln>
               <a:extLst>
                 <a:ext uri="{91240B29-F687-4f45-9708-019B960494DF}">
-                  <a14:hiddenLine xmlns:a14="http://schemas.microsoft.com/office/drawing/2010/main" xmlns="" w="9525">
+                  <a14:hiddenLine xmlns="" xmlns:a14="http://schemas.microsoft.com/office/drawing/2010/main" w="9525">
                     <a:solidFill>
                       <a:srgbClr val="000000"/>
                     </a:solidFill>
@@ -9901,7 +9998,7 @@
               </a:ln>
               <a:extLst>
                 <a:ext uri="{91240B29-F687-4f45-9708-019B960494DF}">
-                  <a14:hiddenLine xmlns:a14="http://schemas.microsoft.com/office/drawing/2010/main" xmlns="" w="9525">
+                  <a14:hiddenLine xmlns="" xmlns:a14="http://schemas.microsoft.com/office/drawing/2010/main" w="9525">
                     <a:solidFill>
                       <a:srgbClr val="000000"/>
                     </a:solidFill>
@@ -9991,7 +10088,7 @@
               </a:ln>
               <a:extLst>
                 <a:ext uri="{91240B29-F687-4f45-9708-019B960494DF}">
-                  <a14:hiddenLine xmlns:a14="http://schemas.microsoft.com/office/drawing/2010/main" xmlns="" w="9525">
+                  <a14:hiddenLine xmlns="" xmlns:a14="http://schemas.microsoft.com/office/drawing/2010/main" w="9525">
                     <a:solidFill>
                       <a:srgbClr val="000000"/>
                     </a:solidFill>
@@ -10053,7 +10150,7 @@
               </a:ln>
               <a:extLst>
                 <a:ext uri="{91240B29-F687-4f45-9708-019B960494DF}">
-                  <a14:hiddenLine xmlns:a14="http://schemas.microsoft.com/office/drawing/2010/main" xmlns="" w="9525">
+                  <a14:hiddenLine xmlns="" xmlns:a14="http://schemas.microsoft.com/office/drawing/2010/main" w="9525">
                     <a:solidFill>
                       <a:srgbClr val="000000"/>
                     </a:solidFill>
@@ -10115,7 +10212,7 @@
               </a:ln>
               <a:extLst>
                 <a:ext uri="{91240B29-F687-4f45-9708-019B960494DF}">
-                  <a14:hiddenLine xmlns:a14="http://schemas.microsoft.com/office/drawing/2010/main" xmlns="" w="9525">
+                  <a14:hiddenLine xmlns="" xmlns:a14="http://schemas.microsoft.com/office/drawing/2010/main" w="9525">
                     <a:solidFill>
                       <a:srgbClr val="000000"/>
                     </a:solidFill>
@@ -10205,7 +10302,7 @@
               </a:ln>
               <a:extLst>
                 <a:ext uri="{91240B29-F687-4f45-9708-019B960494DF}">
-                  <a14:hiddenLine xmlns:a14="http://schemas.microsoft.com/office/drawing/2010/main" xmlns="" w="9525">
+                  <a14:hiddenLine xmlns="" xmlns:a14="http://schemas.microsoft.com/office/drawing/2010/main" w="9525">
                     <a:solidFill>
                       <a:srgbClr val="000000"/>
                     </a:solidFill>
@@ -10295,7 +10392,7 @@
               </a:ln>
               <a:extLst>
                 <a:ext uri="{91240B29-F687-4f45-9708-019B960494DF}">
-                  <a14:hiddenLine xmlns:a14="http://schemas.microsoft.com/office/drawing/2010/main" xmlns="" w="9525">
+                  <a14:hiddenLine xmlns="" xmlns:a14="http://schemas.microsoft.com/office/drawing/2010/main" w="9525">
                     <a:solidFill>
                       <a:srgbClr val="000000"/>
                     </a:solidFill>
@@ -10357,7 +10454,7 @@
               </a:ln>
               <a:extLst>
                 <a:ext uri="{91240B29-F687-4f45-9708-019B960494DF}">
-                  <a14:hiddenLine xmlns:a14="http://schemas.microsoft.com/office/drawing/2010/main" xmlns="" w="9525">
+                  <a14:hiddenLine xmlns="" xmlns:a14="http://schemas.microsoft.com/office/drawing/2010/main" w="9525">
                     <a:solidFill>
                       <a:srgbClr val="000000"/>
                     </a:solidFill>
@@ -10467,7 +10564,7 @@
               </a:ln>
               <a:extLst>
                 <a:ext uri="{91240B29-F687-4f45-9708-019B960494DF}">
-                  <a14:hiddenLine xmlns:a14="http://schemas.microsoft.com/office/drawing/2010/main" xmlns="" w="9525">
+                  <a14:hiddenLine xmlns="" xmlns:a14="http://schemas.microsoft.com/office/drawing/2010/main" w="9525">
                     <a:solidFill>
                       <a:srgbClr val="000000"/>
                     </a:solidFill>
@@ -10551,7 +10648,7 @@
               </a:ln>
               <a:extLst>
                 <a:ext uri="{91240B29-F687-4f45-9708-019B960494DF}">
-                  <a14:hiddenLine xmlns:a14="http://schemas.microsoft.com/office/drawing/2010/main" xmlns="" w="9525">
+                  <a14:hiddenLine xmlns="" xmlns:a14="http://schemas.microsoft.com/office/drawing/2010/main" w="9525">
                     <a:solidFill>
                       <a:srgbClr val="000000"/>
                     </a:solidFill>
@@ -10613,7 +10710,7 @@
               </a:ln>
               <a:extLst>
                 <a:ext uri="{91240B29-F687-4f45-9708-019B960494DF}">
-                  <a14:hiddenLine xmlns:a14="http://schemas.microsoft.com/office/drawing/2010/main" xmlns="" w="9525">
+                  <a14:hiddenLine xmlns="" xmlns:a14="http://schemas.microsoft.com/office/drawing/2010/main" w="9525">
                     <a:solidFill>
                       <a:srgbClr val="000000"/>
                     </a:solidFill>
@@ -10675,7 +10772,7 @@
               </a:ln>
               <a:extLst>
                 <a:ext uri="{91240B29-F687-4f45-9708-019B960494DF}">
-                  <a14:hiddenLine xmlns:a14="http://schemas.microsoft.com/office/drawing/2010/main" xmlns="" w="9525">
+                  <a14:hiddenLine xmlns="" xmlns:a14="http://schemas.microsoft.com/office/drawing/2010/main" w="9525">
                     <a:solidFill>
                       <a:srgbClr val="000000"/>
                     </a:solidFill>
@@ -10765,7 +10862,7 @@
               </a:ln>
               <a:extLst>
                 <a:ext uri="{91240B29-F687-4f45-9708-019B960494DF}">
-                  <a14:hiddenLine xmlns:a14="http://schemas.microsoft.com/office/drawing/2010/main" xmlns="" w="9525">
+                  <a14:hiddenLine xmlns="" xmlns:a14="http://schemas.microsoft.com/office/drawing/2010/main" w="9525">
                     <a:solidFill>
                       <a:srgbClr val="000000"/>
                     </a:solidFill>
@@ -10799,7 +10896,7 @@
               </a:ln>
               <a:extLst>
                 <a:ext uri="{91240B29-F687-4f45-9708-019B960494DF}">
-                  <a14:hiddenLine xmlns:a14="http://schemas.microsoft.com/office/drawing/2010/main" xmlns="" w="9525">
+                  <a14:hiddenLine xmlns="" xmlns:a14="http://schemas.microsoft.com/office/drawing/2010/main" w="9525">
                     <a:solidFill>
                       <a:srgbClr val="000000"/>
                     </a:solidFill>
@@ -10864,7 +10961,7 @@
               </a:ln>
               <a:extLst>
                 <a:ext uri="{91240B29-F687-4f45-9708-019B960494DF}">
-                  <a14:hiddenLine xmlns:a14="http://schemas.microsoft.com/office/drawing/2010/main" xmlns="" w="9525">
+                  <a14:hiddenLine xmlns="" xmlns:a14="http://schemas.microsoft.com/office/drawing/2010/main" w="9525">
                     <a:solidFill>
                       <a:srgbClr val="000000"/>
                     </a:solidFill>
@@ -10954,7 +11051,7 @@
               </a:ln>
               <a:extLst>
                 <a:ext uri="{91240B29-F687-4f45-9708-019B960494DF}">
-                  <a14:hiddenLine xmlns:a14="http://schemas.microsoft.com/office/drawing/2010/main" xmlns="" w="9525">
+                  <a14:hiddenLine xmlns="" xmlns:a14="http://schemas.microsoft.com/office/drawing/2010/main" w="9525">
                     <a:solidFill>
                       <a:srgbClr val="000000"/>
                     </a:solidFill>
@@ -11016,7 +11113,7 @@
               </a:ln>
               <a:extLst>
                 <a:ext uri="{91240B29-F687-4f45-9708-019B960494DF}">
-                  <a14:hiddenLine xmlns:a14="http://schemas.microsoft.com/office/drawing/2010/main" xmlns="" w="9525">
+                  <a14:hiddenLine xmlns="" xmlns:a14="http://schemas.microsoft.com/office/drawing/2010/main" w="9525">
                     <a:solidFill>
                       <a:srgbClr val="000000"/>
                     </a:solidFill>
@@ -11106,7 +11203,7 @@
               </a:ln>
               <a:extLst>
                 <a:ext uri="{91240B29-F687-4f45-9708-019B960494DF}">
-                  <a14:hiddenLine xmlns:a14="http://schemas.microsoft.com/office/drawing/2010/main" xmlns="" w="9525">
+                  <a14:hiddenLine xmlns="" xmlns:a14="http://schemas.microsoft.com/office/drawing/2010/main" w="9525">
                     <a:solidFill>
                       <a:srgbClr val="000000"/>
                     </a:solidFill>
@@ -11171,7 +11268,7 @@
               </a:ln>
               <a:extLst>
                 <a:ext uri="{91240B29-F687-4f45-9708-019B960494DF}">
-                  <a14:hiddenLine xmlns:a14="http://schemas.microsoft.com/office/drawing/2010/main" xmlns="" w="9525">
+                  <a14:hiddenLine xmlns="" xmlns:a14="http://schemas.microsoft.com/office/drawing/2010/main" w="9525">
                     <a:solidFill>
                       <a:srgbClr val="000000"/>
                     </a:solidFill>
@@ -11233,7 +11330,7 @@
               </a:ln>
               <a:extLst>
                 <a:ext uri="{91240B29-F687-4f45-9708-019B960494DF}">
-                  <a14:hiddenLine xmlns:a14="http://schemas.microsoft.com/office/drawing/2010/main" xmlns="" w="9525">
+                  <a14:hiddenLine xmlns="" xmlns:a14="http://schemas.microsoft.com/office/drawing/2010/main" w="9525">
                     <a:solidFill>
                       <a:srgbClr val="000000"/>
                     </a:solidFill>
@@ -11323,7 +11420,7 @@
               </a:ln>
               <a:extLst>
                 <a:ext uri="{91240B29-F687-4f45-9708-019B960494DF}">
-                  <a14:hiddenLine xmlns:a14="http://schemas.microsoft.com/office/drawing/2010/main" xmlns="" w="9525">
+                  <a14:hiddenLine xmlns="" xmlns:a14="http://schemas.microsoft.com/office/drawing/2010/main" w="9525">
                     <a:solidFill>
                       <a:srgbClr val="000000"/>
                     </a:solidFill>
@@ -11413,7 +11510,7 @@
               </a:ln>
               <a:extLst>
                 <a:ext uri="{91240B29-F687-4f45-9708-019B960494DF}">
-                  <a14:hiddenLine xmlns:a14="http://schemas.microsoft.com/office/drawing/2010/main" xmlns="" w="9525">
+                  <a14:hiddenLine xmlns="" xmlns:a14="http://schemas.microsoft.com/office/drawing/2010/main" w="9525">
                     <a:solidFill>
                       <a:srgbClr val="000000"/>
                     </a:solidFill>
@@ -11478,7 +11575,7 @@
               </a:ln>
               <a:extLst>
                 <a:ext uri="{91240B29-F687-4f45-9708-019B960494DF}">
-                  <a14:hiddenLine xmlns:a14="http://schemas.microsoft.com/office/drawing/2010/main" xmlns="" w="9525">
+                  <a14:hiddenLine xmlns="" xmlns:a14="http://schemas.microsoft.com/office/drawing/2010/main" w="9525">
                     <a:solidFill>
                       <a:srgbClr val="000000"/>
                     </a:solidFill>
@@ -11598,7 +11695,7 @@
               </a:ln>
               <a:extLst>
                 <a:ext uri="{91240B29-F687-4f45-9708-019B960494DF}">
-                  <a14:hiddenLine xmlns:a14="http://schemas.microsoft.com/office/drawing/2010/main" xmlns="" w="9525">
+                  <a14:hiddenLine xmlns="" xmlns:a14="http://schemas.microsoft.com/office/drawing/2010/main" w="9525">
                     <a:solidFill>
                       <a:srgbClr val="000000"/>
                     </a:solidFill>
@@ -11696,7 +11793,7 @@
               </a:ln>
               <a:extLst>
                 <a:ext uri="{91240B29-F687-4f45-9708-019B960494DF}">
-                  <a14:hiddenLine xmlns:a14="http://schemas.microsoft.com/office/drawing/2010/main" xmlns="" w="9525">
+                  <a14:hiddenLine xmlns="" xmlns:a14="http://schemas.microsoft.com/office/drawing/2010/main" w="9525">
                     <a:solidFill>
                       <a:srgbClr val="000000"/>
                     </a:solidFill>
@@ -11811,7 +11908,7 @@
               </a:ln>
               <a:extLst>
                 <a:ext uri="{91240B29-F687-4f45-9708-019B960494DF}">
-                  <a14:hiddenLine xmlns:a14="http://schemas.microsoft.com/office/drawing/2010/main" xmlns="" w="9525">
+                  <a14:hiddenLine xmlns="" xmlns:a14="http://schemas.microsoft.com/office/drawing/2010/main" w="9525">
                     <a:solidFill>
                       <a:srgbClr val="000000"/>
                     </a:solidFill>
@@ -11901,7 +11998,7 @@
               </a:ln>
               <a:extLst>
                 <a:ext uri="{91240B29-F687-4f45-9708-019B960494DF}">
-                  <a14:hiddenLine xmlns:a14="http://schemas.microsoft.com/office/drawing/2010/main" xmlns="" w="9525">
+                  <a14:hiddenLine xmlns="" xmlns:a14="http://schemas.microsoft.com/office/drawing/2010/main" w="9525">
                     <a:solidFill>
                       <a:srgbClr val="000000"/>
                     </a:solidFill>
@@ -11966,7 +12063,7 @@
               </a:ln>
               <a:extLst>
                 <a:ext uri="{91240B29-F687-4f45-9708-019B960494DF}">
-                  <a14:hiddenLine xmlns:a14="http://schemas.microsoft.com/office/drawing/2010/main" xmlns="" w="9525">
+                  <a14:hiddenLine xmlns="" xmlns:a14="http://schemas.microsoft.com/office/drawing/2010/main" w="9525">
                     <a:solidFill>
                       <a:srgbClr val="000000"/>
                     </a:solidFill>
@@ -12056,7 +12153,7 @@
               </a:ln>
               <a:extLst>
                 <a:ext uri="{91240B29-F687-4f45-9708-019B960494DF}">
-                  <a14:hiddenLine xmlns:a14="http://schemas.microsoft.com/office/drawing/2010/main" xmlns="" w="9525">
+                  <a14:hiddenLine xmlns="" xmlns:a14="http://schemas.microsoft.com/office/drawing/2010/main" w="9525">
                     <a:solidFill>
                       <a:srgbClr val="000000"/>
                     </a:solidFill>
@@ -12124,7 +12221,7 @@
               </a:ln>
               <a:extLst>
                 <a:ext uri="{91240B29-F687-4f45-9708-019B960494DF}">
-                  <a14:hiddenLine xmlns:a14="http://schemas.microsoft.com/office/drawing/2010/main" xmlns="" w="9525">
+                  <a14:hiddenLine xmlns="" xmlns:a14="http://schemas.microsoft.com/office/drawing/2010/main" w="9525">
                     <a:solidFill>
                       <a:srgbClr val="000000"/>
                     </a:solidFill>
@@ -12214,7 +12311,7 @@
               </a:ln>
               <a:extLst>
                 <a:ext uri="{91240B29-F687-4f45-9708-019B960494DF}">
-                  <a14:hiddenLine xmlns:a14="http://schemas.microsoft.com/office/drawing/2010/main" xmlns="" w="9525">
+                  <a14:hiddenLine xmlns="" xmlns:a14="http://schemas.microsoft.com/office/drawing/2010/main" w="9525">
                     <a:solidFill>
                       <a:srgbClr val="000000"/>
                     </a:solidFill>
@@ -12282,7 +12379,7 @@
               </a:ln>
               <a:extLst>
                 <a:ext uri="{91240B29-F687-4f45-9708-019B960494DF}">
-                  <a14:hiddenLine xmlns:a14="http://schemas.microsoft.com/office/drawing/2010/main" xmlns="" w="9525">
+                  <a14:hiddenLine xmlns="" xmlns:a14="http://schemas.microsoft.com/office/drawing/2010/main" w="9525">
                     <a:solidFill>
                       <a:srgbClr val="000000"/>
                     </a:solidFill>
@@ -12372,7 +12469,7 @@
               </a:ln>
               <a:extLst>
                 <a:ext uri="{91240B29-F687-4f45-9708-019B960494DF}">
-                  <a14:hiddenLine xmlns:a14="http://schemas.microsoft.com/office/drawing/2010/main" xmlns="" w="9525">
+                  <a14:hiddenLine xmlns="" xmlns:a14="http://schemas.microsoft.com/office/drawing/2010/main" w="9525">
                     <a:solidFill>
                       <a:srgbClr val="000000"/>
                     </a:solidFill>
@@ -12406,7 +12503,7 @@
               </a:ln>
               <a:extLst>
                 <a:ext uri="{91240B29-F687-4f45-9708-019B960494DF}">
-                  <a14:hiddenLine xmlns:a14="http://schemas.microsoft.com/office/drawing/2010/main" xmlns="" w="9525">
+                  <a14:hiddenLine xmlns="" xmlns:a14="http://schemas.microsoft.com/office/drawing/2010/main" w="9525">
                     <a:solidFill>
                       <a:srgbClr val="000000"/>
                     </a:solidFill>
@@ -12546,7 +12643,7 @@
           <a:p>
             <a:fld id="{9846A263-1905-4CB0-9C81-B4B3E5CE7713}" type="datetimeFigureOut">
               <a:rPr lang="en-US" smtClean="0"/>
-              <a:t>9/1/2016</a:t>
+              <a:t>9/2/2016</a:t>
             </a:fld>
             <a:endParaRPr lang="en-US"/>
           </a:p>
@@ -13266,7 +13363,17 @@
             </a:r>
             <a:r>
               <a:rPr lang="en-US" dirty="0" smtClean="0"/>
-              <a:t> and plugins for Gulp processing.</a:t>
+              <a:t> and plugins for Gulp processing</a:t>
+            </a:r>
+            <a:r>
+              <a:rPr lang="en-US" dirty="0" smtClean="0"/>
+              <a:t>.</a:t>
+            </a:r>
+          </a:p>
+          <a:p>
+            <a:r>
+              <a:rPr lang="en-US" dirty="0" smtClean="0"/>
+              <a:t>Gulp uses Node’s Require for dependencies.</a:t>
             </a:r>
             <a:endParaRPr lang="en-US" dirty="0"/>
           </a:p>
@@ -13326,7 +13433,11 @@
             </a:r>
             <a:r>
               <a:rPr lang="en-US" dirty="0" smtClean="0"/>
-              <a:t>gulp-cli</a:t>
+              <a:t>gulp</a:t>
+            </a:r>
+            <a:r>
+              <a:rPr lang="en-US" dirty="0" smtClean="0"/>
+              <a:t/>
             </a:r>
             <a:br>
               <a:rPr lang="en-US" dirty="0" smtClean="0"/>
@@ -13381,6 +13492,12 @@
               <a:rPr lang="en-US" dirty="0" smtClean="0"/>
               <a:t>Editor/IDE</a:t>
             </a:r>
+          </a:p>
+          <a:p>
+            <a:r>
+              <a:rPr lang="en-US" dirty="0" smtClean="0"/>
+              <a:t>Command line</a:t>
+            </a:r>
             <a:endParaRPr lang="en-US" dirty="0"/>
           </a:p>
         </p:txBody>
@@ -13400,6 +13517,16 @@
           <a:bodyPr/>
           <a:lstStyle/>
           <a:p>
+            <a:r>
+              <a:rPr lang="en-US" dirty="0" smtClean="0"/>
+              <a:t>Any editor or IDE is fine. For this I will be using VS Code.</a:t>
+            </a:r>
+          </a:p>
+          <a:p>
+            <a:r>
+              <a:rPr lang="en-US" dirty="0" smtClean="0"/>
+              <a:t>Command line or shell prompt. Gulp tasks are run from command line (or from editor/IDE if supported).</a:t>
+            </a:r>
             <a:endParaRPr lang="en-US" dirty="0"/>
           </a:p>
         </p:txBody>
@@ -13408,6 +13535,856 @@
     <p:extLst>
       <p:ext uri="{BB962C8B-B14F-4D97-AF65-F5344CB8AC3E}">
         <p14:creationId xmlns:p14="http://schemas.microsoft.com/office/powerpoint/2010/main" val="3391419431"/>
+      </p:ext>
+    </p:extLst>
+  </p:cSld>
+  <p:clrMapOvr>
+    <a:masterClrMapping/>
+  </p:clrMapOvr>
+</p:sld>
+</file>
+
+<file path=ppt/slides/slide4.xml><?xml version="1.0" encoding="utf-8"?>
+<p:sld xmlns:a="http://schemas.openxmlformats.org/drawingml/2006/main" xmlns:r="http://schemas.openxmlformats.org/officeDocument/2006/relationships" xmlns:p="http://schemas.openxmlformats.org/presentationml/2006/main">
+  <p:cSld>
+    <p:spTree>
+      <p:nvGrpSpPr>
+        <p:cNvPr id="1" name=""/>
+        <p:cNvGrpSpPr/>
+        <p:nvPr/>
+      </p:nvGrpSpPr>
+      <p:grpSpPr>
+        <a:xfrm>
+          <a:off x="0" y="0"/>
+          <a:ext cx="0" cy="0"/>
+          <a:chOff x="0" y="0"/>
+          <a:chExt cx="0" cy="0"/>
+        </a:xfrm>
+      </p:grpSpPr>
+      <p:sp>
+        <p:nvSpPr>
+          <p:cNvPr id="2" name="Title 1"/>
+          <p:cNvSpPr>
+            <a:spLocks noGrp="1"/>
+          </p:cNvSpPr>
+          <p:nvPr>
+            <p:ph type="title"/>
+          </p:nvPr>
+        </p:nvSpPr>
+        <p:spPr/>
+        <p:txBody>
+          <a:bodyPr/>
+          <a:lstStyle/>
+          <a:p>
+            <a:r>
+              <a:rPr lang="en-US" dirty="0" smtClean="0"/>
+              <a:t>The four top level functions of gulp</a:t>
+            </a:r>
+            <a:endParaRPr lang="en-US" dirty="0"/>
+          </a:p>
+        </p:txBody>
+      </p:sp>
+      <p:sp>
+        <p:nvSpPr>
+          <p:cNvPr id="4" name="Text Placeholder 3"/>
+          <p:cNvSpPr>
+            <a:spLocks noGrp="1"/>
+          </p:cNvSpPr>
+          <p:nvPr>
+            <p:ph type="body" sz="half" idx="15"/>
+          </p:nvPr>
+        </p:nvSpPr>
+        <p:spPr>
+          <a:xfrm>
+            <a:off x="1127918" y="3360263"/>
+            <a:ext cx="2100705" cy="3255026"/>
+          </a:xfrm>
+        </p:spPr>
+        <p:txBody>
+          <a:bodyPr/>
+          <a:lstStyle/>
+          <a:p>
+            <a:r>
+              <a:rPr lang="en-US" dirty="0" smtClean="0"/>
+              <a:t>Used to create your tasks.</a:t>
+            </a:r>
+          </a:p>
+          <a:p>
+            <a:r>
+              <a:rPr lang="en-US" dirty="0" smtClean="0"/>
+              <a:t>It takes the following parameters:</a:t>
+            </a:r>
+          </a:p>
+          <a:p>
+            <a:pPr marL="285750" indent="-285750">
+              <a:buFont typeface="Arial" panose="020B0604020202020204" pitchFamily="34" charset="0"/>
+              <a:buChar char="•"/>
+            </a:pPr>
+            <a:r>
+              <a:rPr lang="en-US" dirty="0" smtClean="0"/>
+              <a:t>name - string</a:t>
+            </a:r>
+          </a:p>
+          <a:p>
+            <a:pPr marL="285750" indent="-285750">
+              <a:buFont typeface="Arial" panose="020B0604020202020204" pitchFamily="34" charset="0"/>
+              <a:buChar char="•"/>
+            </a:pPr>
+            <a:r>
+              <a:rPr lang="en-US" dirty="0" smtClean="0"/>
+              <a:t>deps – array of task names - OPTIONAL</a:t>
+            </a:r>
+          </a:p>
+          <a:p>
+            <a:pPr marL="285750" indent="-285750">
+              <a:buFont typeface="Arial" panose="020B0604020202020204" pitchFamily="34" charset="0"/>
+              <a:buChar char="•"/>
+            </a:pPr>
+            <a:r>
+              <a:rPr lang="en-US" dirty="0" err="1" smtClean="0"/>
+              <a:t>fn</a:t>
+            </a:r>
+            <a:r>
+              <a:rPr lang="en-US" dirty="0" smtClean="0"/>
+              <a:t> – the function that is the task</a:t>
+            </a:r>
+          </a:p>
+          <a:p>
+            <a:endParaRPr lang="en-US" dirty="0"/>
+          </a:p>
+        </p:txBody>
+      </p:sp>
+      <p:sp>
+        <p:nvSpPr>
+          <p:cNvPr id="3" name="Text Placeholder 2"/>
+          <p:cNvSpPr>
+            <a:spLocks noGrp="1"/>
+          </p:cNvSpPr>
+          <p:nvPr>
+            <p:ph type="body" idx="1"/>
+          </p:nvPr>
+        </p:nvSpPr>
+        <p:spPr>
+          <a:xfrm>
+            <a:off x="1141411" y="2674463"/>
+            <a:ext cx="2087212" cy="685800"/>
+          </a:xfrm>
+        </p:spPr>
+        <p:txBody>
+          <a:bodyPr/>
+          <a:lstStyle/>
+          <a:p>
+            <a:r>
+              <a:rPr lang="en-US" dirty="0" err="1" smtClean="0"/>
+              <a:t>Gulp.Task</a:t>
+            </a:r>
+            <a:endParaRPr lang="en-US" dirty="0" smtClean="0"/>
+          </a:p>
+        </p:txBody>
+      </p:sp>
+      <p:sp>
+        <p:nvSpPr>
+          <p:cNvPr id="5" name="Text Placeholder 4"/>
+          <p:cNvSpPr>
+            <a:spLocks noGrp="1"/>
+          </p:cNvSpPr>
+          <p:nvPr>
+            <p:ph type="body" sz="quarter" idx="3"/>
+          </p:nvPr>
+        </p:nvSpPr>
+        <p:spPr>
+          <a:xfrm>
+            <a:off x="3842241" y="2674463"/>
+            <a:ext cx="2087212" cy="685800"/>
+          </a:xfrm>
+        </p:spPr>
+        <p:txBody>
+          <a:bodyPr/>
+          <a:lstStyle/>
+          <a:p>
+            <a:r>
+              <a:rPr lang="en-US" dirty="0" err="1" smtClean="0"/>
+              <a:t>Gulp.Src</a:t>
+            </a:r>
+            <a:endParaRPr lang="en-US" dirty="0" smtClean="0"/>
+          </a:p>
+        </p:txBody>
+      </p:sp>
+      <p:sp>
+        <p:nvSpPr>
+          <p:cNvPr id="6" name="Text Placeholder 5"/>
+          <p:cNvSpPr>
+            <a:spLocks noGrp="1"/>
+          </p:cNvSpPr>
+          <p:nvPr>
+            <p:ph type="body" sz="half" idx="16"/>
+          </p:nvPr>
+        </p:nvSpPr>
+        <p:spPr>
+          <a:xfrm>
+            <a:off x="6558766" y="3360263"/>
+            <a:ext cx="2083908" cy="3255026"/>
+          </a:xfrm>
+        </p:spPr>
+        <p:txBody>
+          <a:bodyPr/>
+          <a:lstStyle/>
+          <a:p>
+            <a:r>
+              <a:rPr lang="en-US" dirty="0" smtClean="0"/>
+              <a:t>Tells Gulp the output folder to write to.</a:t>
+            </a:r>
+            <a:endParaRPr lang="en-US" dirty="0"/>
+          </a:p>
+        </p:txBody>
+      </p:sp>
+      <p:sp>
+        <p:nvSpPr>
+          <p:cNvPr id="7" name="Text Placeholder 6"/>
+          <p:cNvSpPr>
+            <a:spLocks noGrp="1"/>
+          </p:cNvSpPr>
+          <p:nvPr>
+            <p:ph type="body" sz="quarter" idx="13"/>
+          </p:nvPr>
+        </p:nvSpPr>
+        <p:spPr>
+          <a:xfrm>
+            <a:off x="6543071" y="2674463"/>
+            <a:ext cx="2100705" cy="685800"/>
+          </a:xfrm>
+        </p:spPr>
+        <p:txBody>
+          <a:bodyPr/>
+          <a:lstStyle/>
+          <a:p>
+            <a:r>
+              <a:rPr lang="en-US" dirty="0" err="1" smtClean="0"/>
+              <a:t>Gulp.Dest</a:t>
+            </a:r>
+            <a:endParaRPr lang="en-US" dirty="0" smtClean="0"/>
+          </a:p>
+        </p:txBody>
+      </p:sp>
+      <p:sp>
+        <p:nvSpPr>
+          <p:cNvPr id="8" name="Text Placeholder 7"/>
+          <p:cNvSpPr>
+            <a:spLocks noGrp="1"/>
+          </p:cNvSpPr>
+          <p:nvPr>
+            <p:ph type="body" sz="half" idx="17"/>
+          </p:nvPr>
+        </p:nvSpPr>
+        <p:spPr>
+          <a:xfrm>
+            <a:off x="3843342" y="3360263"/>
+            <a:ext cx="2100705" cy="3255026"/>
+          </a:xfrm>
+        </p:spPr>
+        <p:txBody>
+          <a:bodyPr/>
+          <a:lstStyle/>
+          <a:p>
+            <a:r>
+              <a:rPr lang="en-US" dirty="0" smtClean="0"/>
+              <a:t>Tells what files to use.</a:t>
+            </a:r>
+          </a:p>
+          <a:p>
+            <a:r>
+              <a:rPr lang="en-US" dirty="0" smtClean="0"/>
+              <a:t>Parameters are:</a:t>
+            </a:r>
+          </a:p>
+          <a:p>
+            <a:pPr marL="285750" indent="-285750">
+              <a:buFont typeface="Arial" panose="020B0604020202020204" pitchFamily="34" charset="0"/>
+              <a:buChar char="•"/>
+            </a:pPr>
+            <a:r>
+              <a:rPr lang="en-US" dirty="0" smtClean="0"/>
+              <a:t>glob - *</a:t>
+            </a:r>
+          </a:p>
+          <a:p>
+            <a:pPr marL="285750" indent="-285750">
+              <a:buFont typeface="Arial" panose="020B0604020202020204" pitchFamily="34" charset="0"/>
+              <a:buChar char="•"/>
+            </a:pPr>
+            <a:r>
+              <a:rPr lang="en-US" dirty="0" smtClean="0"/>
+              <a:t>options object – OPTIONAL</a:t>
+            </a:r>
+          </a:p>
+          <a:p>
+            <a:r>
+              <a:rPr lang="en-US" dirty="0" smtClean="0"/>
+              <a:t>Uses .pipe to chaining it’s output to other plugins.</a:t>
+            </a:r>
+            <a:endParaRPr lang="en-US" dirty="0"/>
+          </a:p>
+        </p:txBody>
+      </p:sp>
+      <p:sp>
+        <p:nvSpPr>
+          <p:cNvPr id="13" name="Text Placeholder 6"/>
+          <p:cNvSpPr txBox="1">
+            <a:spLocks/>
+          </p:cNvSpPr>
+          <p:nvPr/>
+        </p:nvSpPr>
+        <p:spPr>
+          <a:xfrm>
+            <a:off x="9257394" y="2674463"/>
+            <a:ext cx="2100705" cy="685800"/>
+          </a:xfrm>
+          <a:prstGeom prst="rect">
+            <a:avLst/>
+          </a:prstGeom>
+        </p:spPr>
+        <p:txBody>
+          <a:bodyPr vert="horz" lIns="91440" tIns="45720" rIns="91440" bIns="45720" rtlCol="0" anchor="b">
+            <a:noAutofit/>
+          </a:bodyPr>
+          <a:lstStyle>
+            <a:lvl1pPr marL="0" indent="0" algn="l" defTabSz="914400" rtl="0" eaLnBrk="1" latinLnBrk="0" hangingPunct="1">
+              <a:lnSpc>
+                <a:spcPct val="90000"/>
+              </a:lnSpc>
+              <a:spcBef>
+                <a:spcPts val="1000"/>
+              </a:spcBef>
+              <a:buSzPct val="125000"/>
+              <a:buFont typeface="Arial" panose="020B0604020202020204" pitchFamily="34" charset="0"/>
+              <a:buNone/>
+              <a:defRPr sz="2400" b="0" kern="1200" cap="all" baseline="0">
+                <a:solidFill>
+                  <a:schemeClr val="tx1"/>
+                </a:solidFill>
+                <a:latin typeface="+mn-lt"/>
+                <a:ea typeface="+mn-ea"/>
+                <a:cs typeface="+mn-cs"/>
+              </a:defRPr>
+            </a:lvl1pPr>
+            <a:lvl2pPr marL="457200" indent="0" algn="l" defTabSz="914400" rtl="0" eaLnBrk="1" latinLnBrk="0" hangingPunct="1">
+              <a:lnSpc>
+                <a:spcPct val="120000"/>
+              </a:lnSpc>
+              <a:spcBef>
+                <a:spcPts val="500"/>
+              </a:spcBef>
+              <a:buSzPct val="125000"/>
+              <a:buFont typeface="Arial" panose="020B0604020202020204" pitchFamily="34" charset="0"/>
+              <a:buNone/>
+              <a:defRPr sz="2000" b="1" kern="1200">
+                <a:solidFill>
+                  <a:schemeClr val="tx1"/>
+                </a:solidFill>
+                <a:latin typeface="+mn-lt"/>
+                <a:ea typeface="+mn-ea"/>
+                <a:cs typeface="+mn-cs"/>
+              </a:defRPr>
+            </a:lvl2pPr>
+            <a:lvl3pPr marL="914400" indent="0" algn="l" defTabSz="914400" rtl="0" eaLnBrk="1" latinLnBrk="0" hangingPunct="1">
+              <a:lnSpc>
+                <a:spcPct val="120000"/>
+              </a:lnSpc>
+              <a:spcBef>
+                <a:spcPts val="500"/>
+              </a:spcBef>
+              <a:buSzPct val="125000"/>
+              <a:buFont typeface="Arial" panose="020B0604020202020204" pitchFamily="34" charset="0"/>
+              <a:buNone/>
+              <a:defRPr sz="1800" b="1" kern="1200">
+                <a:solidFill>
+                  <a:schemeClr val="tx1"/>
+                </a:solidFill>
+                <a:latin typeface="+mn-lt"/>
+                <a:ea typeface="+mn-ea"/>
+                <a:cs typeface="+mn-cs"/>
+              </a:defRPr>
+            </a:lvl3pPr>
+            <a:lvl4pPr marL="1371600" indent="0" algn="l" defTabSz="914400" rtl="0" eaLnBrk="1" latinLnBrk="0" hangingPunct="1">
+              <a:lnSpc>
+                <a:spcPct val="120000"/>
+              </a:lnSpc>
+              <a:spcBef>
+                <a:spcPts val="500"/>
+              </a:spcBef>
+              <a:buSzPct val="125000"/>
+              <a:buFont typeface="Arial" panose="020B0604020202020204" pitchFamily="34" charset="0"/>
+              <a:buNone/>
+              <a:defRPr sz="1600" b="1" kern="1200">
+                <a:solidFill>
+                  <a:schemeClr val="tx1"/>
+                </a:solidFill>
+                <a:latin typeface="+mn-lt"/>
+                <a:ea typeface="+mn-ea"/>
+                <a:cs typeface="+mn-cs"/>
+              </a:defRPr>
+            </a:lvl4pPr>
+            <a:lvl5pPr marL="1828800" indent="0" algn="l" defTabSz="914400" rtl="0" eaLnBrk="1" latinLnBrk="0" hangingPunct="1">
+              <a:lnSpc>
+                <a:spcPct val="120000"/>
+              </a:lnSpc>
+              <a:spcBef>
+                <a:spcPts val="500"/>
+              </a:spcBef>
+              <a:buSzPct val="125000"/>
+              <a:buFont typeface="Arial" panose="020B0604020202020204" pitchFamily="34" charset="0"/>
+              <a:buNone/>
+              <a:defRPr sz="1600" b="1" kern="1200">
+                <a:solidFill>
+                  <a:schemeClr val="tx1"/>
+                </a:solidFill>
+                <a:latin typeface="+mn-lt"/>
+                <a:ea typeface="+mn-ea"/>
+                <a:cs typeface="+mn-cs"/>
+              </a:defRPr>
+            </a:lvl5pPr>
+            <a:lvl6pPr marL="2286000" indent="0" algn="l" defTabSz="914400" rtl="0" eaLnBrk="1" latinLnBrk="0" hangingPunct="1">
+              <a:lnSpc>
+                <a:spcPct val="120000"/>
+              </a:lnSpc>
+              <a:spcBef>
+                <a:spcPts val="500"/>
+              </a:spcBef>
+              <a:buSzPct val="125000"/>
+              <a:buFont typeface="Arial" panose="020B0604020202020204" pitchFamily="34" charset="0"/>
+              <a:buNone/>
+              <a:defRPr sz="1600" b="1" kern="1200">
+                <a:solidFill>
+                  <a:schemeClr val="tx1"/>
+                </a:solidFill>
+                <a:latin typeface="+mn-lt"/>
+                <a:ea typeface="+mn-ea"/>
+                <a:cs typeface="+mn-cs"/>
+              </a:defRPr>
+            </a:lvl6pPr>
+            <a:lvl7pPr marL="2743200" indent="0" algn="l" defTabSz="914400" rtl="0" eaLnBrk="1" latinLnBrk="0" hangingPunct="1">
+              <a:lnSpc>
+                <a:spcPct val="120000"/>
+              </a:lnSpc>
+              <a:spcBef>
+                <a:spcPts val="500"/>
+              </a:spcBef>
+              <a:buSzPct val="125000"/>
+              <a:buFont typeface="Arial" panose="020B0604020202020204" pitchFamily="34" charset="0"/>
+              <a:buNone/>
+              <a:defRPr sz="1600" b="1" kern="1200">
+                <a:solidFill>
+                  <a:schemeClr val="tx1"/>
+                </a:solidFill>
+                <a:latin typeface="+mn-lt"/>
+                <a:ea typeface="+mn-ea"/>
+                <a:cs typeface="+mn-cs"/>
+              </a:defRPr>
+            </a:lvl7pPr>
+            <a:lvl8pPr marL="3200400" indent="0" algn="l" defTabSz="914400" rtl="0" eaLnBrk="1" latinLnBrk="0" hangingPunct="1">
+              <a:lnSpc>
+                <a:spcPct val="120000"/>
+              </a:lnSpc>
+              <a:spcBef>
+                <a:spcPts val="500"/>
+              </a:spcBef>
+              <a:buSzPct val="125000"/>
+              <a:buFont typeface="Arial" panose="020B0604020202020204" pitchFamily="34" charset="0"/>
+              <a:buNone/>
+              <a:defRPr sz="1600" b="1" kern="1200">
+                <a:solidFill>
+                  <a:schemeClr val="tx1"/>
+                </a:solidFill>
+                <a:latin typeface="+mn-lt"/>
+                <a:ea typeface="+mn-ea"/>
+                <a:cs typeface="+mn-cs"/>
+              </a:defRPr>
+            </a:lvl8pPr>
+            <a:lvl9pPr marL="3657600" indent="0" algn="l" defTabSz="914400" rtl="0" eaLnBrk="1" latinLnBrk="0" hangingPunct="1">
+              <a:lnSpc>
+                <a:spcPct val="120000"/>
+              </a:lnSpc>
+              <a:spcBef>
+                <a:spcPts val="500"/>
+              </a:spcBef>
+              <a:buSzPct val="125000"/>
+              <a:buFont typeface="Arial" panose="020B0604020202020204" pitchFamily="34" charset="0"/>
+              <a:buNone/>
+              <a:defRPr sz="1600" b="1" kern="1200">
+                <a:solidFill>
+                  <a:schemeClr val="tx1"/>
+                </a:solidFill>
+                <a:latin typeface="+mn-lt"/>
+                <a:ea typeface="+mn-ea"/>
+                <a:cs typeface="+mn-cs"/>
+              </a:defRPr>
+            </a:lvl9pPr>
+          </a:lstStyle>
+          <a:p>
+            <a:r>
+              <a:rPr lang="en-US" dirty="0" err="1" smtClean="0"/>
+              <a:t>Gulp.watch</a:t>
+            </a:r>
+            <a:endParaRPr lang="en-US" dirty="0" smtClean="0"/>
+          </a:p>
+        </p:txBody>
+      </p:sp>
+      <p:sp>
+        <p:nvSpPr>
+          <p:cNvPr id="14" name="Text Placeholder 7"/>
+          <p:cNvSpPr txBox="1">
+            <a:spLocks/>
+          </p:cNvSpPr>
+          <p:nvPr/>
+        </p:nvSpPr>
+        <p:spPr>
+          <a:xfrm>
+            <a:off x="9257393" y="3360263"/>
+            <a:ext cx="2100705" cy="3255026"/>
+          </a:xfrm>
+          <a:prstGeom prst="rect">
+            <a:avLst/>
+          </a:prstGeom>
+        </p:spPr>
+        <p:txBody>
+          <a:bodyPr vert="horz" lIns="91440" tIns="45720" rIns="91440" bIns="45720" rtlCol="0" anchor="t">
+            <a:normAutofit/>
+          </a:bodyPr>
+          <a:lstStyle>
+            <a:lvl1pPr marL="0" indent="0" algn="l" defTabSz="914400" rtl="0" eaLnBrk="1" latinLnBrk="0" hangingPunct="1">
+              <a:lnSpc>
+                <a:spcPct val="120000"/>
+              </a:lnSpc>
+              <a:spcBef>
+                <a:spcPts val="1000"/>
+              </a:spcBef>
+              <a:buSzPct val="125000"/>
+              <a:buFont typeface="Arial" panose="020B0604020202020204" pitchFamily="34" charset="0"/>
+              <a:buNone/>
+              <a:defRPr sz="1400" kern="1200">
+                <a:solidFill>
+                  <a:schemeClr val="tx1"/>
+                </a:solidFill>
+                <a:latin typeface="+mn-lt"/>
+                <a:ea typeface="+mn-ea"/>
+                <a:cs typeface="+mn-cs"/>
+              </a:defRPr>
+            </a:lvl1pPr>
+            <a:lvl2pPr marL="457200" indent="0" algn="l" defTabSz="914400" rtl="0" eaLnBrk="1" latinLnBrk="0" hangingPunct="1">
+              <a:lnSpc>
+                <a:spcPct val="120000"/>
+              </a:lnSpc>
+              <a:spcBef>
+                <a:spcPts val="500"/>
+              </a:spcBef>
+              <a:buSzPct val="125000"/>
+              <a:buFont typeface="Arial" panose="020B0604020202020204" pitchFamily="34" charset="0"/>
+              <a:buNone/>
+              <a:defRPr sz="1200" kern="1200">
+                <a:solidFill>
+                  <a:schemeClr val="tx1"/>
+                </a:solidFill>
+                <a:latin typeface="+mn-lt"/>
+                <a:ea typeface="+mn-ea"/>
+                <a:cs typeface="+mn-cs"/>
+              </a:defRPr>
+            </a:lvl2pPr>
+            <a:lvl3pPr marL="914400" indent="0" algn="l" defTabSz="914400" rtl="0" eaLnBrk="1" latinLnBrk="0" hangingPunct="1">
+              <a:lnSpc>
+                <a:spcPct val="120000"/>
+              </a:lnSpc>
+              <a:spcBef>
+                <a:spcPts val="500"/>
+              </a:spcBef>
+              <a:buSzPct val="125000"/>
+              <a:buFont typeface="Arial" panose="020B0604020202020204" pitchFamily="34" charset="0"/>
+              <a:buNone/>
+              <a:defRPr sz="1000" kern="1200">
+                <a:solidFill>
+                  <a:schemeClr val="tx1"/>
+                </a:solidFill>
+                <a:latin typeface="+mn-lt"/>
+                <a:ea typeface="+mn-ea"/>
+                <a:cs typeface="+mn-cs"/>
+              </a:defRPr>
+            </a:lvl3pPr>
+            <a:lvl4pPr marL="1371600" indent="0" algn="l" defTabSz="914400" rtl="0" eaLnBrk="1" latinLnBrk="0" hangingPunct="1">
+              <a:lnSpc>
+                <a:spcPct val="120000"/>
+              </a:lnSpc>
+              <a:spcBef>
+                <a:spcPts val="500"/>
+              </a:spcBef>
+              <a:buSzPct val="125000"/>
+              <a:buFont typeface="Arial" panose="020B0604020202020204" pitchFamily="34" charset="0"/>
+              <a:buNone/>
+              <a:defRPr sz="900" kern="1200">
+                <a:solidFill>
+                  <a:schemeClr val="tx1"/>
+                </a:solidFill>
+                <a:latin typeface="+mn-lt"/>
+                <a:ea typeface="+mn-ea"/>
+                <a:cs typeface="+mn-cs"/>
+              </a:defRPr>
+            </a:lvl4pPr>
+            <a:lvl5pPr marL="1828800" indent="0" algn="l" defTabSz="914400" rtl="0" eaLnBrk="1" latinLnBrk="0" hangingPunct="1">
+              <a:lnSpc>
+                <a:spcPct val="120000"/>
+              </a:lnSpc>
+              <a:spcBef>
+                <a:spcPts val="500"/>
+              </a:spcBef>
+              <a:buSzPct val="125000"/>
+              <a:buFont typeface="Arial" panose="020B0604020202020204" pitchFamily="34" charset="0"/>
+              <a:buNone/>
+              <a:defRPr sz="900" kern="1200">
+                <a:solidFill>
+                  <a:schemeClr val="tx1"/>
+                </a:solidFill>
+                <a:latin typeface="+mn-lt"/>
+                <a:ea typeface="+mn-ea"/>
+                <a:cs typeface="+mn-cs"/>
+              </a:defRPr>
+            </a:lvl5pPr>
+            <a:lvl6pPr marL="2286000" indent="0" algn="l" defTabSz="914400" rtl="0" eaLnBrk="1" latinLnBrk="0" hangingPunct="1">
+              <a:lnSpc>
+                <a:spcPct val="120000"/>
+              </a:lnSpc>
+              <a:spcBef>
+                <a:spcPts val="500"/>
+              </a:spcBef>
+              <a:buSzPct val="125000"/>
+              <a:buFont typeface="Arial" panose="020B0604020202020204" pitchFamily="34" charset="0"/>
+              <a:buNone/>
+              <a:defRPr sz="900" kern="1200">
+                <a:solidFill>
+                  <a:schemeClr val="tx1"/>
+                </a:solidFill>
+                <a:latin typeface="+mn-lt"/>
+                <a:ea typeface="+mn-ea"/>
+                <a:cs typeface="+mn-cs"/>
+              </a:defRPr>
+            </a:lvl6pPr>
+            <a:lvl7pPr marL="2743200" indent="0" algn="l" defTabSz="914400" rtl="0" eaLnBrk="1" latinLnBrk="0" hangingPunct="1">
+              <a:lnSpc>
+                <a:spcPct val="120000"/>
+              </a:lnSpc>
+              <a:spcBef>
+                <a:spcPts val="500"/>
+              </a:spcBef>
+              <a:buSzPct val="125000"/>
+              <a:buFont typeface="Arial" panose="020B0604020202020204" pitchFamily="34" charset="0"/>
+              <a:buNone/>
+              <a:defRPr sz="900" kern="1200">
+                <a:solidFill>
+                  <a:schemeClr val="tx1"/>
+                </a:solidFill>
+                <a:latin typeface="+mn-lt"/>
+                <a:ea typeface="+mn-ea"/>
+                <a:cs typeface="+mn-cs"/>
+              </a:defRPr>
+            </a:lvl7pPr>
+            <a:lvl8pPr marL="3200400" indent="0" algn="l" defTabSz="914400" rtl="0" eaLnBrk="1" latinLnBrk="0" hangingPunct="1">
+              <a:lnSpc>
+                <a:spcPct val="120000"/>
+              </a:lnSpc>
+              <a:spcBef>
+                <a:spcPts val="500"/>
+              </a:spcBef>
+              <a:buSzPct val="125000"/>
+              <a:buFont typeface="Arial" panose="020B0604020202020204" pitchFamily="34" charset="0"/>
+              <a:buNone/>
+              <a:defRPr sz="900" kern="1200">
+                <a:solidFill>
+                  <a:schemeClr val="tx1"/>
+                </a:solidFill>
+                <a:latin typeface="+mn-lt"/>
+                <a:ea typeface="+mn-ea"/>
+                <a:cs typeface="+mn-cs"/>
+              </a:defRPr>
+            </a:lvl8pPr>
+            <a:lvl9pPr marL="3657600" indent="0" algn="l" defTabSz="914400" rtl="0" eaLnBrk="1" latinLnBrk="0" hangingPunct="1">
+              <a:lnSpc>
+                <a:spcPct val="120000"/>
+              </a:lnSpc>
+              <a:spcBef>
+                <a:spcPts val="500"/>
+              </a:spcBef>
+              <a:buSzPct val="125000"/>
+              <a:buFont typeface="Arial" panose="020B0604020202020204" pitchFamily="34" charset="0"/>
+              <a:buNone/>
+              <a:defRPr sz="900" kern="1200">
+                <a:solidFill>
+                  <a:schemeClr val="tx1"/>
+                </a:solidFill>
+                <a:latin typeface="+mn-lt"/>
+                <a:ea typeface="+mn-ea"/>
+                <a:cs typeface="+mn-cs"/>
+              </a:defRPr>
+            </a:lvl9pPr>
+          </a:lstStyle>
+          <a:p>
+            <a:r>
+              <a:rPr lang="en-US" dirty="0" smtClean="0"/>
+              <a:t>Used primarily to run tasks when files change.</a:t>
+            </a:r>
+          </a:p>
+          <a:p>
+            <a:r>
+              <a:rPr lang="en-US" dirty="0" smtClean="0"/>
+              <a:t>Pass into it:</a:t>
+            </a:r>
+          </a:p>
+          <a:p>
+            <a:pPr marL="285750" indent="-285750">
+              <a:buFont typeface="Arial" panose="020B0604020202020204" pitchFamily="34" charset="0"/>
+              <a:buChar char="•"/>
+            </a:pPr>
+            <a:r>
+              <a:rPr lang="en-US" dirty="0" smtClean="0"/>
+              <a:t>glob</a:t>
+            </a:r>
+          </a:p>
+          <a:p>
+            <a:pPr marL="285750" indent="-285750">
+              <a:buFont typeface="Arial" panose="020B0604020202020204" pitchFamily="34" charset="0"/>
+              <a:buChar char="•"/>
+            </a:pPr>
+            <a:r>
+              <a:rPr lang="en-US" dirty="0" smtClean="0"/>
+              <a:t>options object – OPTIONAL</a:t>
+            </a:r>
+          </a:p>
+          <a:p>
+            <a:pPr marL="285750" indent="-285750">
+              <a:buFont typeface="Arial" panose="020B0604020202020204" pitchFamily="34" charset="0"/>
+              <a:buChar char="•"/>
+            </a:pPr>
+            <a:r>
+              <a:rPr lang="en-US" dirty="0" smtClean="0"/>
+              <a:t>Array of tasks to run OR callback function</a:t>
+            </a:r>
+            <a:endParaRPr lang="en-US" dirty="0"/>
+          </a:p>
+        </p:txBody>
+      </p:sp>
+      <p:sp>
+        <p:nvSpPr>
+          <p:cNvPr id="15" name="Rectangle 14"/>
+          <p:cNvSpPr/>
+          <p:nvPr/>
+        </p:nvSpPr>
+        <p:spPr>
+          <a:xfrm>
+            <a:off x="2274632" y="6338290"/>
+            <a:ext cx="8568267" cy="276999"/>
+          </a:xfrm>
+          <a:prstGeom prst="rect">
+            <a:avLst/>
+          </a:prstGeom>
+        </p:spPr>
+        <p:txBody>
+          <a:bodyPr wrap="square">
+            <a:spAutoFit/>
+          </a:bodyPr>
+          <a:lstStyle/>
+          <a:p>
+            <a:r>
+              <a:rPr lang="en-US" sz="1200" dirty="0" smtClean="0"/>
+              <a:t>* - “In </a:t>
+            </a:r>
+            <a:r>
+              <a:rPr lang="en-US" sz="1200" dirty="0"/>
+              <a:t>computer programming, in particular in a Unix-like environment, glob patterns specify sets of filenames with wildcard characters</a:t>
+            </a:r>
+            <a:r>
+              <a:rPr lang="en-US" sz="1200" dirty="0" smtClean="0"/>
+              <a:t>.”</a:t>
+            </a:r>
+            <a:endParaRPr lang="en-US" sz="1200" dirty="0"/>
+          </a:p>
+        </p:txBody>
+      </p:sp>
+    </p:spTree>
+    <p:extLst>
+      <p:ext uri="{BB962C8B-B14F-4D97-AF65-F5344CB8AC3E}">
+        <p14:creationId xmlns:p14="http://schemas.microsoft.com/office/powerpoint/2010/main" val="2924712162"/>
+      </p:ext>
+    </p:extLst>
+  </p:cSld>
+  <p:clrMapOvr>
+    <a:masterClrMapping/>
+  </p:clrMapOvr>
+</p:sld>
+</file>
+
+<file path=ppt/slides/slide5.xml><?xml version="1.0" encoding="utf-8"?>
+<p:sld xmlns:a="http://schemas.openxmlformats.org/drawingml/2006/main" xmlns:r="http://schemas.openxmlformats.org/officeDocument/2006/relationships" xmlns:p="http://schemas.openxmlformats.org/presentationml/2006/main">
+  <p:cSld>
+    <p:spTree>
+      <p:nvGrpSpPr>
+        <p:cNvPr id="1" name=""/>
+        <p:cNvGrpSpPr/>
+        <p:nvPr/>
+      </p:nvGrpSpPr>
+      <p:grpSpPr>
+        <a:xfrm>
+          <a:off x="0" y="0"/>
+          <a:ext cx="0" cy="0"/>
+          <a:chOff x="0" y="0"/>
+          <a:chExt cx="0" cy="0"/>
+        </a:xfrm>
+      </p:grpSpPr>
+      <p:sp>
+        <p:nvSpPr>
+          <p:cNvPr id="2" name="Title 1"/>
+          <p:cNvSpPr>
+            <a:spLocks noGrp="1"/>
+          </p:cNvSpPr>
+          <p:nvPr>
+            <p:ph type="ctrTitle"/>
+          </p:nvPr>
+        </p:nvSpPr>
+        <p:spPr/>
+        <p:txBody>
+          <a:bodyPr/>
+          <a:lstStyle/>
+          <a:p>
+            <a:r>
+              <a:rPr lang="en-US" dirty="0" smtClean="0"/>
+              <a:t>demo</a:t>
+            </a:r>
+            <a:endParaRPr lang="en-US" dirty="0"/>
+          </a:p>
+        </p:txBody>
+      </p:sp>
+      <p:sp>
+        <p:nvSpPr>
+          <p:cNvPr id="3" name="Subtitle 2"/>
+          <p:cNvSpPr>
+            <a:spLocks noGrp="1"/>
+          </p:cNvSpPr>
+          <p:nvPr>
+            <p:ph type="subTitle" idx="1"/>
+          </p:nvPr>
+        </p:nvSpPr>
+        <p:spPr/>
+        <p:txBody>
+          <a:bodyPr/>
+          <a:lstStyle/>
+          <a:p>
+            <a:r>
+              <a:rPr lang="en-US" dirty="0" smtClean="0"/>
+              <a:t>Show us gulp doing some stuff!</a:t>
+            </a:r>
+            <a:endParaRPr lang="en-US" dirty="0"/>
+          </a:p>
+        </p:txBody>
+      </p:sp>
+    </p:spTree>
+    <p:extLst>
+      <p:ext uri="{BB962C8B-B14F-4D97-AF65-F5344CB8AC3E}">
+        <p14:creationId xmlns:p14="http://schemas.microsoft.com/office/powerpoint/2010/main" val="3885203162"/>
       </p:ext>
     </p:extLst>
   </p:cSld>

</xml_diff>